<commit_message>
GameManager 외 몇 가지
GameManager
- Trigger를 사용해서 Scene을 전환하는 코드
- 클릭 이벤트 코드

GameScenes
- 생성자에 트리거 요소 추가
- 어떤 버튼이 클릭되었는지 알려주는 ClickCheck 메소드 추가
-- GameWidgets / Button 클래스의 Clickchecker 메소드 이용

GameWidgets
- ClickChecker 메소드 구현

images 에 background 추가

기획서 수정

도식도에 프로그램 구조 설명 추가
</commit_message>
<xml_diff>
--- a/도식도.pptx
+++ b/도식도.pptx
@@ -6,11 +6,12 @@
   </p:sldMasterIdLst>
   <p:sldIdLst>
     <p:sldId id="256" r:id="rId2"/>
-    <p:sldId id="257" r:id="rId3"/>
-    <p:sldId id="258" r:id="rId4"/>
-    <p:sldId id="260" r:id="rId5"/>
-    <p:sldId id="259" r:id="rId6"/>
-    <p:sldId id="261" r:id="rId7"/>
+    <p:sldId id="262" r:id="rId3"/>
+    <p:sldId id="257" r:id="rId4"/>
+    <p:sldId id="258" r:id="rId5"/>
+    <p:sldId id="260" r:id="rId6"/>
+    <p:sldId id="259" r:id="rId7"/>
+    <p:sldId id="261" r:id="rId8"/>
   </p:sldIdLst>
   <p:sldSz cx="9144000" cy="6858000" type="screen4x3"/>
   <p:notesSz cx="6858000" cy="9144000"/>
@@ -109,6 +110,22 @@
       </a:defRPr>
     </a:lvl9pPr>
   </p:defaultTextStyle>
+  <p:extLst>
+    <p:ext uri="{EFAFB233-063F-42B5-8137-9DF3F51BA10A}">
+      <p15:sldGuideLst xmlns:p15="http://schemas.microsoft.com/office/powerpoint/2012/main">
+        <p15:guide id="1" orient="horz" pos="2160">
+          <p15:clr>
+            <a:srgbClr val="A4A3A4"/>
+          </p15:clr>
+        </p15:guide>
+        <p15:guide id="2" pos="2880">
+          <p15:clr>
+            <a:srgbClr val="A4A3A4"/>
+          </p15:clr>
+        </p15:guide>
+      </p15:sldGuideLst>
+    </p:ext>
+  </p:extLst>
 </p:presentation>
 </file>
 
@@ -150,10 +167,9 @@
           <a:lstStyle/>
           <a:p>
             <a:r>
-              <a:rPr lang="ko-KR" altLang="en-US" smtClean="0"/>
+              <a:rPr lang="ko-KR" altLang="en-US"/>
               <a:t>마스터 제목 스타일 편집</a:t>
             </a:r>
-            <a:endParaRPr lang="ko-KR" altLang="en-US"/>
           </a:p>
         </p:txBody>
       </p:sp>
@@ -269,10 +285,9 @@
           </a:lstStyle>
           <a:p>
             <a:r>
-              <a:rPr lang="ko-KR" altLang="en-US" smtClean="0"/>
+              <a:rPr lang="ko-KR" altLang="en-US"/>
               <a:t>마스터 부제목 스타일 편집</a:t>
             </a:r>
-            <a:endParaRPr lang="ko-KR" altLang="en-US"/>
           </a:p>
         </p:txBody>
       </p:sp>
@@ -293,7 +308,7 @@
           <a:p>
             <a:fld id="{C90163FB-1BA7-439A-8860-161CF6400CAF}" type="datetimeFigureOut">
               <a:rPr lang="ko-KR" altLang="en-US" smtClean="0"/>
-              <a:t>2018-12-07</a:t>
+              <a:t>2018-12-09</a:t>
             </a:fld>
             <a:endParaRPr lang="ko-KR" altLang="en-US"/>
           </a:p>
@@ -387,10 +402,9 @@
           <a:lstStyle/>
           <a:p>
             <a:r>
-              <a:rPr lang="ko-KR" altLang="en-US" smtClean="0"/>
+              <a:rPr lang="ko-KR" altLang="en-US"/>
               <a:t>마스터 제목 스타일 편집</a:t>
             </a:r>
-            <a:endParaRPr lang="ko-KR" altLang="en-US"/>
           </a:p>
         </p:txBody>
       </p:sp>
@@ -411,38 +425,37 @@
           <a:p>
             <a:pPr lvl="0"/>
             <a:r>
-              <a:rPr lang="ko-KR" altLang="en-US" smtClean="0"/>
+              <a:rPr lang="ko-KR" altLang="en-US"/>
               <a:t>마스터 텍스트 스타일을 편집합니다</a:t>
             </a:r>
           </a:p>
           <a:p>
             <a:pPr lvl="1"/>
             <a:r>
-              <a:rPr lang="ko-KR" altLang="en-US" smtClean="0"/>
+              <a:rPr lang="ko-KR" altLang="en-US"/>
               <a:t>둘째 수준</a:t>
             </a:r>
           </a:p>
           <a:p>
             <a:pPr lvl="2"/>
             <a:r>
-              <a:rPr lang="ko-KR" altLang="en-US" smtClean="0"/>
+              <a:rPr lang="ko-KR" altLang="en-US"/>
               <a:t>셋째 수준</a:t>
             </a:r>
           </a:p>
           <a:p>
             <a:pPr lvl="3"/>
             <a:r>
-              <a:rPr lang="ko-KR" altLang="en-US" smtClean="0"/>
+              <a:rPr lang="ko-KR" altLang="en-US"/>
               <a:t>넷째 수준</a:t>
             </a:r>
           </a:p>
           <a:p>
             <a:pPr lvl="4"/>
             <a:r>
-              <a:rPr lang="ko-KR" altLang="en-US" smtClean="0"/>
+              <a:rPr lang="ko-KR" altLang="en-US"/>
               <a:t>다섯째 수준</a:t>
             </a:r>
-            <a:endParaRPr lang="ko-KR" altLang="en-US"/>
           </a:p>
         </p:txBody>
       </p:sp>
@@ -463,7 +476,7 @@
           <a:p>
             <a:fld id="{C90163FB-1BA7-439A-8860-161CF6400CAF}" type="datetimeFigureOut">
               <a:rPr lang="ko-KR" altLang="en-US" smtClean="0"/>
-              <a:t>2018-12-07</a:t>
+              <a:t>2018-12-09</a:t>
             </a:fld>
             <a:endParaRPr lang="ko-KR" altLang="en-US"/>
           </a:p>
@@ -562,10 +575,9 @@
           <a:lstStyle/>
           <a:p>
             <a:r>
-              <a:rPr lang="ko-KR" altLang="en-US" smtClean="0"/>
+              <a:rPr lang="ko-KR" altLang="en-US"/>
               <a:t>마스터 제목 스타일 편집</a:t>
             </a:r>
-            <a:endParaRPr lang="ko-KR" altLang="en-US"/>
           </a:p>
         </p:txBody>
       </p:sp>
@@ -591,38 +603,37 @@
           <a:p>
             <a:pPr lvl="0"/>
             <a:r>
-              <a:rPr lang="ko-KR" altLang="en-US" smtClean="0"/>
+              <a:rPr lang="ko-KR" altLang="en-US"/>
               <a:t>마스터 텍스트 스타일을 편집합니다</a:t>
             </a:r>
           </a:p>
           <a:p>
             <a:pPr lvl="1"/>
             <a:r>
-              <a:rPr lang="ko-KR" altLang="en-US" smtClean="0"/>
+              <a:rPr lang="ko-KR" altLang="en-US"/>
               <a:t>둘째 수준</a:t>
             </a:r>
           </a:p>
           <a:p>
             <a:pPr lvl="2"/>
             <a:r>
-              <a:rPr lang="ko-KR" altLang="en-US" smtClean="0"/>
+              <a:rPr lang="ko-KR" altLang="en-US"/>
               <a:t>셋째 수준</a:t>
             </a:r>
           </a:p>
           <a:p>
             <a:pPr lvl="3"/>
             <a:r>
-              <a:rPr lang="ko-KR" altLang="en-US" smtClean="0"/>
+              <a:rPr lang="ko-KR" altLang="en-US"/>
               <a:t>넷째 수준</a:t>
             </a:r>
           </a:p>
           <a:p>
             <a:pPr lvl="4"/>
             <a:r>
-              <a:rPr lang="ko-KR" altLang="en-US" smtClean="0"/>
+              <a:rPr lang="ko-KR" altLang="en-US"/>
               <a:t>다섯째 수준</a:t>
             </a:r>
-            <a:endParaRPr lang="ko-KR" altLang="en-US"/>
           </a:p>
         </p:txBody>
       </p:sp>
@@ -643,7 +654,7 @@
           <a:p>
             <a:fld id="{C90163FB-1BA7-439A-8860-161CF6400CAF}" type="datetimeFigureOut">
               <a:rPr lang="ko-KR" altLang="en-US" smtClean="0"/>
-              <a:t>2018-12-07</a:t>
+              <a:t>2018-12-09</a:t>
             </a:fld>
             <a:endParaRPr lang="ko-KR" altLang="en-US"/>
           </a:p>
@@ -737,10 +748,9 @@
           <a:lstStyle/>
           <a:p>
             <a:r>
-              <a:rPr lang="ko-KR" altLang="en-US" smtClean="0"/>
+              <a:rPr lang="ko-KR" altLang="en-US"/>
               <a:t>마스터 제목 스타일 편집</a:t>
             </a:r>
-            <a:endParaRPr lang="ko-KR" altLang="en-US"/>
           </a:p>
         </p:txBody>
       </p:sp>
@@ -761,38 +771,37 @@
           <a:p>
             <a:pPr lvl="0"/>
             <a:r>
-              <a:rPr lang="ko-KR" altLang="en-US" smtClean="0"/>
+              <a:rPr lang="ko-KR" altLang="en-US"/>
               <a:t>마스터 텍스트 스타일을 편집합니다</a:t>
             </a:r>
           </a:p>
           <a:p>
             <a:pPr lvl="1"/>
             <a:r>
-              <a:rPr lang="ko-KR" altLang="en-US" smtClean="0"/>
+              <a:rPr lang="ko-KR" altLang="en-US"/>
               <a:t>둘째 수준</a:t>
             </a:r>
           </a:p>
           <a:p>
             <a:pPr lvl="2"/>
             <a:r>
-              <a:rPr lang="ko-KR" altLang="en-US" smtClean="0"/>
+              <a:rPr lang="ko-KR" altLang="en-US"/>
               <a:t>셋째 수준</a:t>
             </a:r>
           </a:p>
           <a:p>
             <a:pPr lvl="3"/>
             <a:r>
-              <a:rPr lang="ko-KR" altLang="en-US" smtClean="0"/>
+              <a:rPr lang="ko-KR" altLang="en-US"/>
               <a:t>넷째 수준</a:t>
             </a:r>
           </a:p>
           <a:p>
             <a:pPr lvl="4"/>
             <a:r>
-              <a:rPr lang="ko-KR" altLang="en-US" smtClean="0"/>
+              <a:rPr lang="ko-KR" altLang="en-US"/>
               <a:t>다섯째 수준</a:t>
             </a:r>
-            <a:endParaRPr lang="ko-KR" altLang="en-US"/>
           </a:p>
         </p:txBody>
       </p:sp>
@@ -813,7 +822,7 @@
           <a:p>
             <a:fld id="{C90163FB-1BA7-439A-8860-161CF6400CAF}" type="datetimeFigureOut">
               <a:rPr lang="ko-KR" altLang="en-US" smtClean="0"/>
-              <a:t>2018-12-07</a:t>
+              <a:t>2018-12-09</a:t>
             </a:fld>
             <a:endParaRPr lang="ko-KR" altLang="en-US"/>
           </a:p>
@@ -916,10 +925,9 @@
           </a:lstStyle>
           <a:p>
             <a:r>
-              <a:rPr lang="ko-KR" altLang="en-US" smtClean="0"/>
+              <a:rPr lang="ko-KR" altLang="en-US"/>
               <a:t>마스터 제목 스타일 편집</a:t>
             </a:r>
-            <a:endParaRPr lang="ko-KR" altLang="en-US"/>
           </a:p>
         </p:txBody>
       </p:sp>
@@ -1036,7 +1044,7 @@
           <a:p>
             <a:pPr lvl="0"/>
             <a:r>
-              <a:rPr lang="ko-KR" altLang="en-US" smtClean="0"/>
+              <a:rPr lang="ko-KR" altLang="en-US"/>
               <a:t>마스터 텍스트 스타일을 편집합니다</a:t>
             </a:r>
           </a:p>
@@ -1059,7 +1067,7 @@
           <a:p>
             <a:fld id="{C90163FB-1BA7-439A-8860-161CF6400CAF}" type="datetimeFigureOut">
               <a:rPr lang="ko-KR" altLang="en-US" smtClean="0"/>
-              <a:t>2018-12-07</a:t>
+              <a:t>2018-12-09</a:t>
             </a:fld>
             <a:endParaRPr lang="ko-KR" altLang="en-US"/>
           </a:p>
@@ -1153,10 +1161,9 @@
           <a:lstStyle/>
           <a:p>
             <a:r>
-              <a:rPr lang="ko-KR" altLang="en-US" smtClean="0"/>
+              <a:rPr lang="ko-KR" altLang="en-US"/>
               <a:t>마스터 제목 스타일 편집</a:t>
             </a:r>
-            <a:endParaRPr lang="ko-KR" altLang="en-US"/>
           </a:p>
         </p:txBody>
       </p:sp>
@@ -1210,38 +1217,37 @@
           <a:p>
             <a:pPr lvl="0"/>
             <a:r>
-              <a:rPr lang="ko-KR" altLang="en-US" smtClean="0"/>
+              <a:rPr lang="ko-KR" altLang="en-US"/>
               <a:t>마스터 텍스트 스타일을 편집합니다</a:t>
             </a:r>
           </a:p>
           <a:p>
             <a:pPr lvl="1"/>
             <a:r>
-              <a:rPr lang="ko-KR" altLang="en-US" smtClean="0"/>
+              <a:rPr lang="ko-KR" altLang="en-US"/>
               <a:t>둘째 수준</a:t>
             </a:r>
           </a:p>
           <a:p>
             <a:pPr lvl="2"/>
             <a:r>
-              <a:rPr lang="ko-KR" altLang="en-US" smtClean="0"/>
+              <a:rPr lang="ko-KR" altLang="en-US"/>
               <a:t>셋째 수준</a:t>
             </a:r>
           </a:p>
           <a:p>
             <a:pPr lvl="3"/>
             <a:r>
-              <a:rPr lang="ko-KR" altLang="en-US" smtClean="0"/>
+              <a:rPr lang="ko-KR" altLang="en-US"/>
               <a:t>넷째 수준</a:t>
             </a:r>
           </a:p>
           <a:p>
             <a:pPr lvl="4"/>
             <a:r>
-              <a:rPr lang="ko-KR" altLang="en-US" smtClean="0"/>
+              <a:rPr lang="ko-KR" altLang="en-US"/>
               <a:t>다섯째 수준</a:t>
             </a:r>
-            <a:endParaRPr lang="ko-KR" altLang="en-US"/>
           </a:p>
         </p:txBody>
       </p:sp>
@@ -1295,38 +1301,37 @@
           <a:p>
             <a:pPr lvl="0"/>
             <a:r>
-              <a:rPr lang="ko-KR" altLang="en-US" smtClean="0"/>
+              <a:rPr lang="ko-KR" altLang="en-US"/>
               <a:t>마스터 텍스트 스타일을 편집합니다</a:t>
             </a:r>
           </a:p>
           <a:p>
             <a:pPr lvl="1"/>
             <a:r>
-              <a:rPr lang="ko-KR" altLang="en-US" smtClean="0"/>
+              <a:rPr lang="ko-KR" altLang="en-US"/>
               <a:t>둘째 수준</a:t>
             </a:r>
           </a:p>
           <a:p>
             <a:pPr lvl="2"/>
             <a:r>
-              <a:rPr lang="ko-KR" altLang="en-US" smtClean="0"/>
+              <a:rPr lang="ko-KR" altLang="en-US"/>
               <a:t>셋째 수준</a:t>
             </a:r>
           </a:p>
           <a:p>
             <a:pPr lvl="3"/>
             <a:r>
-              <a:rPr lang="ko-KR" altLang="en-US" smtClean="0"/>
+              <a:rPr lang="ko-KR" altLang="en-US"/>
               <a:t>넷째 수준</a:t>
             </a:r>
           </a:p>
           <a:p>
             <a:pPr lvl="4"/>
             <a:r>
-              <a:rPr lang="ko-KR" altLang="en-US" smtClean="0"/>
+              <a:rPr lang="ko-KR" altLang="en-US"/>
               <a:t>다섯째 수준</a:t>
             </a:r>
-            <a:endParaRPr lang="ko-KR" altLang="en-US"/>
           </a:p>
         </p:txBody>
       </p:sp>
@@ -1347,7 +1352,7 @@
           <a:p>
             <a:fld id="{C90163FB-1BA7-439A-8860-161CF6400CAF}" type="datetimeFigureOut">
               <a:rPr lang="ko-KR" altLang="en-US" smtClean="0"/>
-              <a:t>2018-12-07</a:t>
+              <a:t>2018-12-09</a:t>
             </a:fld>
             <a:endParaRPr lang="ko-KR" altLang="en-US"/>
           </a:p>
@@ -1445,10 +1450,9 @@
           </a:lstStyle>
           <a:p>
             <a:r>
-              <a:rPr lang="ko-KR" altLang="en-US" smtClean="0"/>
+              <a:rPr lang="ko-KR" altLang="en-US"/>
               <a:t>마스터 제목 스타일 편집</a:t>
             </a:r>
-            <a:endParaRPr lang="ko-KR" altLang="en-US"/>
           </a:p>
         </p:txBody>
       </p:sp>
@@ -1511,7 +1515,7 @@
           <a:p>
             <a:pPr lvl="0"/>
             <a:r>
-              <a:rPr lang="ko-KR" altLang="en-US" smtClean="0"/>
+              <a:rPr lang="ko-KR" altLang="en-US"/>
               <a:t>마스터 텍스트 스타일을 편집합니다</a:t>
             </a:r>
           </a:p>
@@ -1567,38 +1571,37 @@
           <a:p>
             <a:pPr lvl="0"/>
             <a:r>
-              <a:rPr lang="ko-KR" altLang="en-US" smtClean="0"/>
+              <a:rPr lang="ko-KR" altLang="en-US"/>
               <a:t>마스터 텍스트 스타일을 편집합니다</a:t>
             </a:r>
           </a:p>
           <a:p>
             <a:pPr lvl="1"/>
             <a:r>
-              <a:rPr lang="ko-KR" altLang="en-US" smtClean="0"/>
+              <a:rPr lang="ko-KR" altLang="en-US"/>
               <a:t>둘째 수준</a:t>
             </a:r>
           </a:p>
           <a:p>
             <a:pPr lvl="2"/>
             <a:r>
-              <a:rPr lang="ko-KR" altLang="en-US" smtClean="0"/>
+              <a:rPr lang="ko-KR" altLang="en-US"/>
               <a:t>셋째 수준</a:t>
             </a:r>
           </a:p>
           <a:p>
             <a:pPr lvl="3"/>
             <a:r>
-              <a:rPr lang="ko-KR" altLang="en-US" smtClean="0"/>
+              <a:rPr lang="ko-KR" altLang="en-US"/>
               <a:t>넷째 수준</a:t>
             </a:r>
           </a:p>
           <a:p>
             <a:pPr lvl="4"/>
             <a:r>
-              <a:rPr lang="ko-KR" altLang="en-US" smtClean="0"/>
+              <a:rPr lang="ko-KR" altLang="en-US"/>
               <a:t>다섯째 수준</a:t>
             </a:r>
-            <a:endParaRPr lang="ko-KR" altLang="en-US"/>
           </a:p>
         </p:txBody>
       </p:sp>
@@ -1661,7 +1664,7 @@
           <a:p>
             <a:pPr lvl="0"/>
             <a:r>
-              <a:rPr lang="ko-KR" altLang="en-US" smtClean="0"/>
+              <a:rPr lang="ko-KR" altLang="en-US"/>
               <a:t>마스터 텍스트 스타일을 편집합니다</a:t>
             </a:r>
           </a:p>
@@ -1717,38 +1720,37 @@
           <a:p>
             <a:pPr lvl="0"/>
             <a:r>
-              <a:rPr lang="ko-KR" altLang="en-US" smtClean="0"/>
+              <a:rPr lang="ko-KR" altLang="en-US"/>
               <a:t>마스터 텍스트 스타일을 편집합니다</a:t>
             </a:r>
           </a:p>
           <a:p>
             <a:pPr lvl="1"/>
             <a:r>
-              <a:rPr lang="ko-KR" altLang="en-US" smtClean="0"/>
+              <a:rPr lang="ko-KR" altLang="en-US"/>
               <a:t>둘째 수준</a:t>
             </a:r>
           </a:p>
           <a:p>
             <a:pPr lvl="2"/>
             <a:r>
-              <a:rPr lang="ko-KR" altLang="en-US" smtClean="0"/>
+              <a:rPr lang="ko-KR" altLang="en-US"/>
               <a:t>셋째 수준</a:t>
             </a:r>
           </a:p>
           <a:p>
             <a:pPr lvl="3"/>
             <a:r>
-              <a:rPr lang="ko-KR" altLang="en-US" smtClean="0"/>
+              <a:rPr lang="ko-KR" altLang="en-US"/>
               <a:t>넷째 수준</a:t>
             </a:r>
           </a:p>
           <a:p>
             <a:pPr lvl="4"/>
             <a:r>
-              <a:rPr lang="ko-KR" altLang="en-US" smtClean="0"/>
+              <a:rPr lang="ko-KR" altLang="en-US"/>
               <a:t>다섯째 수준</a:t>
             </a:r>
-            <a:endParaRPr lang="ko-KR" altLang="en-US"/>
           </a:p>
         </p:txBody>
       </p:sp>
@@ -1769,7 +1771,7 @@
           <a:p>
             <a:fld id="{C90163FB-1BA7-439A-8860-161CF6400CAF}" type="datetimeFigureOut">
               <a:rPr lang="ko-KR" altLang="en-US" smtClean="0"/>
-              <a:t>2018-12-07</a:t>
+              <a:t>2018-12-09</a:t>
             </a:fld>
             <a:endParaRPr lang="ko-KR" altLang="en-US"/>
           </a:p>
@@ -1863,10 +1865,9 @@
           <a:lstStyle/>
           <a:p>
             <a:r>
-              <a:rPr lang="ko-KR" altLang="en-US" smtClean="0"/>
+              <a:rPr lang="ko-KR" altLang="en-US"/>
               <a:t>마스터 제목 스타일 편집</a:t>
             </a:r>
-            <a:endParaRPr lang="ko-KR" altLang="en-US"/>
           </a:p>
         </p:txBody>
       </p:sp>
@@ -1887,7 +1888,7 @@
           <a:p>
             <a:fld id="{C90163FB-1BA7-439A-8860-161CF6400CAF}" type="datetimeFigureOut">
               <a:rPr lang="ko-KR" altLang="en-US" smtClean="0"/>
-              <a:t>2018-12-07</a:t>
+              <a:t>2018-12-09</a:t>
             </a:fld>
             <a:endParaRPr lang="ko-KR" altLang="en-US"/>
           </a:p>
@@ -1982,7 +1983,7 @@
           <a:p>
             <a:fld id="{C90163FB-1BA7-439A-8860-161CF6400CAF}" type="datetimeFigureOut">
               <a:rPr lang="ko-KR" altLang="en-US" smtClean="0"/>
-              <a:t>2018-12-07</a:t>
+              <a:t>2018-12-09</a:t>
             </a:fld>
             <a:endParaRPr lang="ko-KR" altLang="en-US"/>
           </a:p>
@@ -2085,10 +2086,9 @@
           </a:lstStyle>
           <a:p>
             <a:r>
-              <a:rPr lang="ko-KR" altLang="en-US" smtClean="0"/>
+              <a:rPr lang="ko-KR" altLang="en-US"/>
               <a:t>마스터 제목 스타일 편집</a:t>
             </a:r>
-            <a:endParaRPr lang="ko-KR" altLang="en-US"/>
           </a:p>
         </p:txBody>
       </p:sp>
@@ -2142,38 +2142,37 @@
           <a:p>
             <a:pPr lvl="0"/>
             <a:r>
-              <a:rPr lang="ko-KR" altLang="en-US" smtClean="0"/>
+              <a:rPr lang="ko-KR" altLang="en-US"/>
               <a:t>마스터 텍스트 스타일을 편집합니다</a:t>
             </a:r>
           </a:p>
           <a:p>
             <a:pPr lvl="1"/>
             <a:r>
-              <a:rPr lang="ko-KR" altLang="en-US" smtClean="0"/>
+              <a:rPr lang="ko-KR" altLang="en-US"/>
               <a:t>둘째 수준</a:t>
             </a:r>
           </a:p>
           <a:p>
             <a:pPr lvl="2"/>
             <a:r>
-              <a:rPr lang="ko-KR" altLang="en-US" smtClean="0"/>
+              <a:rPr lang="ko-KR" altLang="en-US"/>
               <a:t>셋째 수준</a:t>
             </a:r>
           </a:p>
           <a:p>
             <a:pPr lvl="3"/>
             <a:r>
-              <a:rPr lang="ko-KR" altLang="en-US" smtClean="0"/>
+              <a:rPr lang="ko-KR" altLang="en-US"/>
               <a:t>넷째 수준</a:t>
             </a:r>
           </a:p>
           <a:p>
             <a:pPr lvl="4"/>
             <a:r>
-              <a:rPr lang="ko-KR" altLang="en-US" smtClean="0"/>
+              <a:rPr lang="ko-KR" altLang="en-US"/>
               <a:t>다섯째 수준</a:t>
             </a:r>
-            <a:endParaRPr lang="ko-KR" altLang="en-US"/>
           </a:p>
         </p:txBody>
       </p:sp>
@@ -2236,7 +2235,7 @@
           <a:p>
             <a:pPr lvl="0"/>
             <a:r>
-              <a:rPr lang="ko-KR" altLang="en-US" smtClean="0"/>
+              <a:rPr lang="ko-KR" altLang="en-US"/>
               <a:t>마스터 텍스트 스타일을 편집합니다</a:t>
             </a:r>
           </a:p>
@@ -2259,7 +2258,7 @@
           <a:p>
             <a:fld id="{C90163FB-1BA7-439A-8860-161CF6400CAF}" type="datetimeFigureOut">
               <a:rPr lang="ko-KR" altLang="en-US" smtClean="0"/>
-              <a:t>2018-12-07</a:t>
+              <a:t>2018-12-09</a:t>
             </a:fld>
             <a:endParaRPr lang="ko-KR" altLang="en-US"/>
           </a:p>
@@ -2362,10 +2361,9 @@
           </a:lstStyle>
           <a:p>
             <a:r>
-              <a:rPr lang="ko-KR" altLang="en-US" smtClean="0"/>
+              <a:rPr lang="ko-KR" altLang="en-US"/>
               <a:t>마스터 제목 스타일 편집</a:t>
             </a:r>
-            <a:endParaRPr lang="ko-KR" altLang="en-US"/>
           </a:p>
         </p:txBody>
       </p:sp>
@@ -2489,7 +2487,7 @@
           <a:p>
             <a:pPr lvl="0"/>
             <a:r>
-              <a:rPr lang="ko-KR" altLang="en-US" smtClean="0"/>
+              <a:rPr lang="ko-KR" altLang="en-US"/>
               <a:t>마스터 텍스트 스타일을 편집합니다</a:t>
             </a:r>
           </a:p>
@@ -2512,7 +2510,7 @@
           <a:p>
             <a:fld id="{C90163FB-1BA7-439A-8860-161CF6400CAF}" type="datetimeFigureOut">
               <a:rPr lang="ko-KR" altLang="en-US" smtClean="0"/>
-              <a:t>2018-12-07</a:t>
+              <a:t>2018-12-09</a:t>
             </a:fld>
             <a:endParaRPr lang="ko-KR" altLang="en-US"/>
           </a:p>
@@ -2621,10 +2619,9 @@
           <a:lstStyle/>
           <a:p>
             <a:r>
-              <a:rPr lang="ko-KR" altLang="en-US" smtClean="0"/>
+              <a:rPr lang="ko-KR" altLang="en-US"/>
               <a:t>마스터 제목 스타일 편집</a:t>
             </a:r>
-            <a:endParaRPr lang="ko-KR" altLang="en-US"/>
           </a:p>
         </p:txBody>
       </p:sp>
@@ -2655,38 +2652,37 @@
           <a:p>
             <a:pPr lvl="0"/>
             <a:r>
-              <a:rPr lang="ko-KR" altLang="en-US" smtClean="0"/>
+              <a:rPr lang="ko-KR" altLang="en-US"/>
               <a:t>마스터 텍스트 스타일을 편집합니다</a:t>
             </a:r>
           </a:p>
           <a:p>
             <a:pPr lvl="1"/>
             <a:r>
-              <a:rPr lang="ko-KR" altLang="en-US" smtClean="0"/>
+              <a:rPr lang="ko-KR" altLang="en-US"/>
               <a:t>둘째 수준</a:t>
             </a:r>
           </a:p>
           <a:p>
             <a:pPr lvl="2"/>
             <a:r>
-              <a:rPr lang="ko-KR" altLang="en-US" smtClean="0"/>
+              <a:rPr lang="ko-KR" altLang="en-US"/>
               <a:t>셋째 수준</a:t>
             </a:r>
           </a:p>
           <a:p>
             <a:pPr lvl="3"/>
             <a:r>
-              <a:rPr lang="ko-KR" altLang="en-US" smtClean="0"/>
+              <a:rPr lang="ko-KR" altLang="en-US"/>
               <a:t>넷째 수준</a:t>
             </a:r>
           </a:p>
           <a:p>
             <a:pPr lvl="4"/>
             <a:r>
-              <a:rPr lang="ko-KR" altLang="en-US" smtClean="0"/>
+              <a:rPr lang="ko-KR" altLang="en-US"/>
               <a:t>다섯째 수준</a:t>
             </a:r>
-            <a:endParaRPr lang="ko-KR" altLang="en-US"/>
           </a:p>
         </p:txBody>
       </p:sp>
@@ -2725,7 +2721,7 @@
           <a:p>
             <a:fld id="{C90163FB-1BA7-439A-8860-161CF6400CAF}" type="datetimeFigureOut">
               <a:rPr lang="ko-KR" altLang="en-US" smtClean="0"/>
-              <a:t>2018-12-07</a:t>
+              <a:t>2018-12-09</a:t>
             </a:fld>
             <a:endParaRPr lang="ko-KR" altLang="en-US"/>
           </a:p>
@@ -3137,7 +3133,7 @@
           <a:p>
             <a:pPr algn="ctr"/>
             <a:r>
-              <a:rPr lang="en-US" altLang="ko-KR" b="1" dirty="0" smtClean="0"/>
+              <a:rPr lang="en-US" altLang="ko-KR" b="1" dirty="0"/>
               <a:t>Main</a:t>
             </a:r>
             <a:endParaRPr lang="ko-KR" altLang="en-US" b="1" dirty="0"/>
@@ -3181,7 +3177,7 @@
           <a:p>
             <a:pPr algn="ctr"/>
             <a:r>
-              <a:rPr lang="en-US" altLang="ko-KR" b="1" dirty="0" smtClean="0"/>
+              <a:rPr lang="en-US" altLang="ko-KR" b="1" dirty="0"/>
               <a:t>Drawing</a:t>
             </a:r>
             <a:endParaRPr lang="ko-KR" altLang="en-US" b="1" dirty="0"/>
@@ -3225,7 +3221,7 @@
           <a:p>
             <a:pPr algn="ctr"/>
             <a:r>
-              <a:rPr lang="en-US" altLang="ko-KR" b="1" dirty="0" smtClean="0"/>
+              <a:rPr lang="en-US" altLang="ko-KR" b="1" dirty="0"/>
               <a:t>Guess</a:t>
             </a:r>
           </a:p>
@@ -3268,7 +3264,7 @@
           <a:p>
             <a:pPr algn="ctr"/>
             <a:r>
-              <a:rPr lang="en-US" altLang="ko-KR" b="1" dirty="0" smtClean="0"/>
+              <a:rPr lang="en-US" altLang="ko-KR" b="1" dirty="0"/>
               <a:t>ReadyDraw</a:t>
             </a:r>
           </a:p>
@@ -3311,7 +3307,7 @@
           <a:p>
             <a:pPr algn="ctr"/>
             <a:r>
-              <a:rPr lang="en-US" altLang="ko-KR" b="1" dirty="0" smtClean="0"/>
+              <a:rPr lang="en-US" altLang="ko-KR" b="1" dirty="0"/>
               <a:t>Result</a:t>
             </a:r>
             <a:endParaRPr lang="ko-KR" altLang="en-US" b="1" dirty="0"/>
@@ -3566,14 +3562,48 @@
       </p:grpSpPr>
       <p:sp>
         <p:nvSpPr>
-          <p:cNvPr id="4" name="직사각형 3"/>
+          <p:cNvPr id="2" name="제목 1">
+            <a:extLst>
+              <a:ext uri="{FF2B5EF4-FFF2-40B4-BE49-F238E27FC236}">
+                <a16:creationId xmlns:a16="http://schemas.microsoft.com/office/drawing/2014/main" id="{514EA54D-35EF-442F-8505-E808FA2F0116}"/>
+              </a:ext>
+            </a:extLst>
+          </p:cNvPr>
+          <p:cNvSpPr>
+            <a:spLocks noGrp="1"/>
+          </p:cNvSpPr>
+          <p:nvPr>
+            <p:ph type="title"/>
+          </p:nvPr>
+        </p:nvSpPr>
+        <p:spPr/>
+        <p:txBody>
+          <a:bodyPr/>
+          <a:lstStyle/>
+          <a:p>
+            <a:r>
+              <a:rPr lang="ko-KR" altLang="en-US" dirty="0"/>
+              <a:t>프로그램의 구조</a:t>
+            </a:r>
+          </a:p>
+        </p:txBody>
+      </p:sp>
+      <p:sp>
+        <p:nvSpPr>
+          <p:cNvPr id="4" name="직사각형 3">
+            <a:extLst>
+              <a:ext uri="{FF2B5EF4-FFF2-40B4-BE49-F238E27FC236}">
+                <a16:creationId xmlns:a16="http://schemas.microsoft.com/office/drawing/2014/main" id="{590A5DE0-2339-4527-96D8-3696364C9B38}"/>
+              </a:ext>
+            </a:extLst>
+          </p:cNvPr>
           <p:cNvSpPr/>
           <p:nvPr/>
         </p:nvSpPr>
         <p:spPr>
           <a:xfrm>
-            <a:off x="395536" y="764704"/>
-            <a:ext cx="8424936" cy="5256584"/>
+            <a:off x="1115616" y="1854556"/>
+            <a:ext cx="2088232" cy="1430427"/>
           </a:xfrm>
           <a:prstGeom prst="rect">
             <a:avLst/>
@@ -3600,72 +3630,32 @@
           <a:lstStyle/>
           <a:p>
             <a:pPr algn="ctr"/>
-            <a:endParaRPr lang="ko-KR" altLang="en-US"/>
-          </a:p>
-        </p:txBody>
-      </p:sp>
-      <p:sp>
-        <p:nvSpPr>
-          <p:cNvPr id="5" name="TextBox 4"/>
-          <p:cNvSpPr txBox="1"/>
-          <p:nvPr/>
-        </p:nvSpPr>
-        <p:spPr>
-          <a:xfrm>
-            <a:off x="3311860" y="1025739"/>
-            <a:ext cx="2592288" cy="646331"/>
-          </a:xfrm>
-          <a:prstGeom prst="rect">
-            <a:avLst/>
-          </a:prstGeom>
-          <a:noFill/>
-        </p:spPr>
-        <p:txBody>
-          <a:bodyPr wrap="square" rtlCol="0">
-            <a:spAutoFit/>
-          </a:bodyPr>
-          <a:lstStyle/>
-          <a:p>
-            <a:pPr algn="ctr"/>
-            <a:r>
-              <a:rPr lang="en-US" altLang="ko-KR" dirty="0" err="1" smtClean="0"/>
-              <a:t>Py</a:t>
-            </a:r>
-            <a:r>
-              <a:rPr lang="en-US" altLang="ko-KR" dirty="0" smtClean="0"/>
-              <a:t> Catch Mind</a:t>
-            </a:r>
-          </a:p>
-          <a:p>
-            <a:pPr algn="ctr"/>
-            <a:r>
-              <a:rPr lang="en-US" altLang="ko-KR" dirty="0" smtClean="0"/>
-              <a:t>(</a:t>
-            </a:r>
-            <a:r>
-              <a:rPr lang="en-US" altLang="ko-KR" dirty="0" err="1" smtClean="0"/>
-              <a:t>MainUI</a:t>
-            </a:r>
-            <a:r>
-              <a:rPr lang="en-US" altLang="ko-KR" dirty="0" smtClean="0"/>
-              <a:t>)</a:t>
-            </a:r>
-            <a:endParaRPr lang="ko-KR" altLang="en-US" dirty="0"/>
-          </a:p>
-        </p:txBody>
-      </p:sp>
-      <p:sp>
-        <p:nvSpPr>
-          <p:cNvPr id="6" name="모서리가 둥근 직사각형 5"/>
+            <a:r>
+              <a:rPr lang="en-US" altLang="ko-KR" b="1" dirty="0" err="1"/>
+              <a:t>GameManager</a:t>
+            </a:r>
+            <a:endParaRPr lang="ko-KR" altLang="en-US" b="1" dirty="0"/>
+          </a:p>
+        </p:txBody>
+      </p:sp>
+      <p:sp>
+        <p:nvSpPr>
+          <p:cNvPr id="7" name="직사각형 6">
+            <a:extLst>
+              <a:ext uri="{FF2B5EF4-FFF2-40B4-BE49-F238E27FC236}">
+                <a16:creationId xmlns:a16="http://schemas.microsoft.com/office/drawing/2014/main" id="{E189C93F-3E93-43A2-AB35-9BECE2309EB0}"/>
+              </a:ext>
+            </a:extLst>
+          </p:cNvPr>
           <p:cNvSpPr/>
           <p:nvPr/>
         </p:nvSpPr>
         <p:spPr>
           <a:xfrm>
-            <a:off x="5148064" y="2492896"/>
-            <a:ext cx="1512168" cy="1224136"/>
-          </a:xfrm>
-          <a:prstGeom prst="roundRect">
+            <a:off x="1151620" y="4268555"/>
+            <a:ext cx="2088232" cy="1430427"/>
+          </a:xfrm>
+          <a:prstGeom prst="rect">
             <a:avLst/>
           </a:prstGeom>
         </p:spPr>
@@ -3691,25 +3681,31 @@
           <a:p>
             <a:pPr algn="ctr"/>
             <a:r>
-              <a:rPr lang="en-US" altLang="ko-KR" dirty="0" smtClean="0"/>
-              <a:t>Start</a:t>
-            </a:r>
-            <a:endParaRPr lang="ko-KR" altLang="en-US" dirty="0"/>
-          </a:p>
-        </p:txBody>
-      </p:sp>
-      <p:sp>
-        <p:nvSpPr>
-          <p:cNvPr id="7" name="모서리가 둥근 직사각형 6"/>
+              <a:rPr lang="en-US" altLang="ko-KR" b="1" dirty="0" err="1"/>
+              <a:t>GameScenes</a:t>
+            </a:r>
+            <a:endParaRPr lang="ko-KR" altLang="en-US" b="1" dirty="0"/>
+          </a:p>
+        </p:txBody>
+      </p:sp>
+      <p:sp>
+        <p:nvSpPr>
+          <p:cNvPr id="8" name="직사각형 7">
+            <a:extLst>
+              <a:ext uri="{FF2B5EF4-FFF2-40B4-BE49-F238E27FC236}">
+                <a16:creationId xmlns:a16="http://schemas.microsoft.com/office/drawing/2014/main" id="{18AB41E4-6867-4980-9BD7-F33C916BBA86}"/>
+              </a:ext>
+            </a:extLst>
+          </p:cNvPr>
           <p:cNvSpPr/>
           <p:nvPr/>
         </p:nvSpPr>
         <p:spPr>
           <a:xfrm>
-            <a:off x="2699792" y="2492896"/>
-            <a:ext cx="1728192" cy="1296144"/>
-          </a:xfrm>
-          <a:prstGeom prst="roundRect">
+            <a:off x="5652120" y="4263279"/>
+            <a:ext cx="2088232" cy="1430427"/>
+          </a:xfrm>
+          <a:prstGeom prst="rect">
             <a:avLst/>
           </a:prstGeom>
         </p:spPr>
@@ -3735,40 +3731,31 @@
           <a:p>
             <a:pPr algn="ctr"/>
             <a:r>
-              <a:rPr lang="ko-KR" altLang="en-US" dirty="0" smtClean="0"/>
-              <a:t>인원</a:t>
-            </a:r>
-            <a:endParaRPr lang="en-US" altLang="ko-KR" dirty="0" smtClean="0"/>
-          </a:p>
-          <a:p>
-            <a:pPr algn="ctr"/>
-            <a:r>
-              <a:rPr lang="en-US" altLang="ko-KR" dirty="0" smtClean="0"/>
-              <a:t>2~4</a:t>
-            </a:r>
-          </a:p>
-          <a:p>
-            <a:pPr algn="ctr"/>
-            <a:r>
-              <a:rPr lang="en-US" altLang="ko-KR" dirty="0" err="1" smtClean="0"/>
-              <a:t>SetPlayer</a:t>
-            </a:r>
-            <a:endParaRPr lang="ko-KR" altLang="en-US" dirty="0"/>
-          </a:p>
-        </p:txBody>
-      </p:sp>
-      <p:sp>
-        <p:nvSpPr>
-          <p:cNvPr id="8" name="모서리가 둥근 직사각형 7"/>
+              <a:rPr lang="en-US" altLang="ko-KR" b="1" dirty="0" err="1"/>
+              <a:t>GameWidgets</a:t>
+            </a:r>
+            <a:endParaRPr lang="ko-KR" altLang="en-US" b="1" dirty="0"/>
+          </a:p>
+        </p:txBody>
+      </p:sp>
+      <p:sp>
+        <p:nvSpPr>
+          <p:cNvPr id="9" name="직사각형 8">
+            <a:extLst>
+              <a:ext uri="{FF2B5EF4-FFF2-40B4-BE49-F238E27FC236}">
+                <a16:creationId xmlns:a16="http://schemas.microsoft.com/office/drawing/2014/main" id="{70B79700-6448-4CFD-877C-0D6C105A9DDC}"/>
+              </a:ext>
+            </a:extLst>
+          </p:cNvPr>
           <p:cNvSpPr/>
           <p:nvPr/>
         </p:nvSpPr>
         <p:spPr>
           <a:xfrm>
-            <a:off x="7812360" y="836712"/>
-            <a:ext cx="864096" cy="648072"/>
-          </a:xfrm>
-          <a:prstGeom prst="roundRect">
+            <a:off x="6117130" y="1758204"/>
+            <a:ext cx="1152128" cy="782356"/>
+          </a:xfrm>
+          <a:prstGeom prst="rect">
             <a:avLst/>
           </a:prstGeom>
         </p:spPr>
@@ -3794,25 +3781,31 @@
           <a:p>
             <a:pPr algn="ctr"/>
             <a:r>
-              <a:rPr lang="en-US" altLang="ko-KR" dirty="0" smtClean="0"/>
-              <a:t>Quit</a:t>
-            </a:r>
-            <a:endParaRPr lang="ko-KR" altLang="en-US" dirty="0"/>
-          </a:p>
-        </p:txBody>
-      </p:sp>
-      <p:sp>
-        <p:nvSpPr>
-          <p:cNvPr id="9" name="모서리가 둥근 직사각형 8"/>
+              <a:rPr lang="en-US" altLang="ko-KR" b="1" dirty="0" err="1"/>
+              <a:t>WordDB</a:t>
+            </a:r>
+            <a:endParaRPr lang="ko-KR" altLang="en-US" b="1" dirty="0"/>
+          </a:p>
+        </p:txBody>
+      </p:sp>
+      <p:sp>
+        <p:nvSpPr>
+          <p:cNvPr id="11" name="직사각형 10">
+            <a:extLst>
+              <a:ext uri="{FF2B5EF4-FFF2-40B4-BE49-F238E27FC236}">
+                <a16:creationId xmlns:a16="http://schemas.microsoft.com/office/drawing/2014/main" id="{9C674E41-A629-4B6D-BBB3-B319F5AEACA2}"/>
+              </a:ext>
+            </a:extLst>
+          </p:cNvPr>
           <p:cNvSpPr/>
           <p:nvPr/>
         </p:nvSpPr>
         <p:spPr>
           <a:xfrm>
-            <a:off x="467544" y="908720"/>
-            <a:ext cx="792088" cy="486351"/>
-          </a:xfrm>
-          <a:prstGeom prst="roundRect">
+            <a:off x="6119362" y="2749179"/>
+            <a:ext cx="1152128" cy="782356"/>
+          </a:xfrm>
+          <a:prstGeom prst="rect">
             <a:avLst/>
           </a:prstGeom>
         </p:spPr>
@@ -3838,77 +3831,150 @@
           <a:p>
             <a:pPr algn="ctr"/>
             <a:r>
-              <a:rPr lang="en-US" altLang="ko-KR" dirty="0" smtClean="0"/>
-              <a:t>Help</a:t>
-            </a:r>
-            <a:endParaRPr lang="ko-KR" altLang="en-US" dirty="0"/>
-          </a:p>
-        </p:txBody>
-      </p:sp>
-      <p:sp>
-        <p:nvSpPr>
-          <p:cNvPr id="10" name="모서리가 둥근 직사각형 9"/>
-          <p:cNvSpPr/>
+              <a:rPr lang="en-US" altLang="ko-KR" b="1" dirty="0" err="1"/>
+              <a:t>ScoreDB</a:t>
+            </a:r>
+            <a:endParaRPr lang="ko-KR" altLang="en-US" b="1" dirty="0"/>
+          </a:p>
+        </p:txBody>
+      </p:sp>
+      <p:cxnSp>
+        <p:nvCxnSpPr>
+          <p:cNvPr id="12" name="직선 화살표 연결선 11">
+            <a:extLst>
+              <a:ext uri="{FF2B5EF4-FFF2-40B4-BE49-F238E27FC236}">
+                <a16:creationId xmlns:a16="http://schemas.microsoft.com/office/drawing/2014/main" id="{47F51F60-578A-46F4-B794-202097C60CF2}"/>
+              </a:ext>
+            </a:extLst>
+          </p:cNvPr>
+          <p:cNvCxnSpPr>
+            <a:cxnSpLocks/>
+          </p:cNvCxnSpPr>
           <p:nvPr/>
-        </p:nvSpPr>
-        <p:spPr>
-          <a:xfrm>
-            <a:off x="2267744" y="4117345"/>
-            <a:ext cx="4680520" cy="504056"/>
-          </a:xfrm>
-          <a:prstGeom prst="roundRect">
+        </p:nvCxnSpPr>
+        <p:spPr>
+          <a:xfrm flipV="1">
+            <a:off x="2159732" y="3284985"/>
+            <a:ext cx="0" cy="978294"/>
+          </a:xfrm>
+          <a:prstGeom prst="straightConnector1">
             <a:avLst/>
           </a:prstGeom>
+          <a:ln w="28575">
+            <a:solidFill>
+              <a:schemeClr val="tx1"/>
+            </a:solidFill>
+            <a:tailEnd type="arrow"/>
+          </a:ln>
         </p:spPr>
         <p:style>
-          <a:lnRef idx="2">
-            <a:schemeClr val="accent1">
-              <a:shade val="50000"/>
-            </a:schemeClr>
+          <a:lnRef idx="1">
+            <a:schemeClr val="accent1"/>
           </a:lnRef>
-          <a:fillRef idx="1">
+          <a:fillRef idx="0">
             <a:schemeClr val="accent1"/>
           </a:fillRef>
           <a:effectRef idx="0">
             <a:schemeClr val="accent1"/>
           </a:effectRef>
           <a:fontRef idx="minor">
-            <a:schemeClr val="lt1"/>
+            <a:schemeClr val="tx1"/>
           </a:fontRef>
         </p:style>
-        <p:txBody>
-          <a:bodyPr rtlCol="0" anchor="ctr"/>
-          <a:lstStyle/>
-          <a:p>
-            <a:pPr algn="ctr"/>
-            <a:r>
-              <a:rPr lang="en-US" altLang="ko-KR" dirty="0" smtClean="0"/>
-              <a:t>*</a:t>
-            </a:r>
-            <a:r>
-              <a:rPr lang="ko-KR" altLang="en-US" dirty="0" smtClean="0"/>
-              <a:t>인원을 </a:t>
-            </a:r>
-            <a:r>
-              <a:rPr lang="en-US" altLang="ko-KR" dirty="0" smtClean="0"/>
-              <a:t>2~4</a:t>
-            </a:r>
-            <a:r>
-              <a:rPr lang="ko-KR" altLang="en-US" dirty="0" smtClean="0"/>
-              <a:t>명으로 지정해주세요</a:t>
-            </a:r>
-            <a:r>
-              <a:rPr lang="en-US" altLang="ko-KR" dirty="0" smtClean="0"/>
-              <a:t>.</a:t>
-            </a:r>
-            <a:endParaRPr lang="ko-KR" altLang="en-US" dirty="0"/>
-          </a:p>
-        </p:txBody>
-      </p:sp>
+      </p:cxnSp>
+      <p:cxnSp>
+        <p:nvCxnSpPr>
+          <p:cNvPr id="15" name="직선 화살표 연결선 14">
+            <a:extLst>
+              <a:ext uri="{FF2B5EF4-FFF2-40B4-BE49-F238E27FC236}">
+                <a16:creationId xmlns:a16="http://schemas.microsoft.com/office/drawing/2014/main" id="{6615FC58-C2D1-4C90-96BE-9F2957E35E1D}"/>
+              </a:ext>
+            </a:extLst>
+          </p:cNvPr>
+          <p:cNvCxnSpPr>
+            <a:cxnSpLocks/>
+            <a:stCxn id="8" idx="1"/>
+          </p:cNvCxnSpPr>
+          <p:nvPr/>
+        </p:nvCxnSpPr>
+        <p:spPr>
+          <a:xfrm flipH="1">
+            <a:off x="3239852" y="4978493"/>
+            <a:ext cx="2412268" cy="0"/>
+          </a:xfrm>
+          <a:prstGeom prst="straightConnector1">
+            <a:avLst/>
+          </a:prstGeom>
+          <a:ln w="28575">
+            <a:solidFill>
+              <a:schemeClr val="tx1"/>
+            </a:solidFill>
+            <a:tailEnd type="arrow"/>
+          </a:ln>
+        </p:spPr>
+        <p:style>
+          <a:lnRef idx="1">
+            <a:schemeClr val="accent1"/>
+          </a:lnRef>
+          <a:fillRef idx="0">
+            <a:schemeClr val="accent1"/>
+          </a:fillRef>
+          <a:effectRef idx="0">
+            <a:schemeClr val="accent1"/>
+          </a:effectRef>
+          <a:fontRef idx="minor">
+            <a:schemeClr val="tx1"/>
+          </a:fontRef>
+        </p:style>
+      </p:cxnSp>
+      <p:cxnSp>
+        <p:nvCxnSpPr>
+          <p:cNvPr id="18" name="직선 화살표 연결선 17">
+            <a:extLst>
+              <a:ext uri="{FF2B5EF4-FFF2-40B4-BE49-F238E27FC236}">
+                <a16:creationId xmlns:a16="http://schemas.microsoft.com/office/drawing/2014/main" id="{A76640C2-6690-44CE-9FA5-BDBD6BD9D98E}"/>
+              </a:ext>
+            </a:extLst>
+          </p:cNvPr>
+          <p:cNvCxnSpPr>
+            <a:cxnSpLocks/>
+          </p:cNvCxnSpPr>
+          <p:nvPr/>
+        </p:nvCxnSpPr>
+        <p:spPr>
+          <a:xfrm flipH="1">
+            <a:off x="3239852" y="2569769"/>
+            <a:ext cx="2772308" cy="0"/>
+          </a:xfrm>
+          <a:prstGeom prst="straightConnector1">
+            <a:avLst/>
+          </a:prstGeom>
+          <a:ln w="28575">
+            <a:solidFill>
+              <a:schemeClr val="tx1"/>
+            </a:solidFill>
+            <a:tailEnd type="arrow"/>
+          </a:ln>
+        </p:spPr>
+        <p:style>
+          <a:lnRef idx="1">
+            <a:schemeClr val="accent1"/>
+          </a:lnRef>
+          <a:fillRef idx="0">
+            <a:schemeClr val="accent1"/>
+          </a:fillRef>
+          <a:effectRef idx="0">
+            <a:schemeClr val="accent1"/>
+          </a:effectRef>
+          <a:fontRef idx="minor">
+            <a:schemeClr val="tx1"/>
+          </a:fontRef>
+        </p:style>
+      </p:cxnSp>
     </p:spTree>
     <p:extLst>
       <p:ext uri="{BB962C8B-B14F-4D97-AF65-F5344CB8AC3E}">
-        <p14:creationId xmlns:p14="http://schemas.microsoft.com/office/powerpoint/2010/main" val="1110847625"/>
+        <p14:creationId xmlns:p14="http://schemas.microsoft.com/office/powerpoint/2010/main" val="3542440501"/>
       </p:ext>
     </p:extLst>
   </p:cSld>
@@ -3983,8 +4049,8 @@
         </p:nvSpPr>
         <p:spPr>
           <a:xfrm>
-            <a:off x="3743908" y="1042187"/>
-            <a:ext cx="2592288" cy="369332"/>
+            <a:off x="3311860" y="1025739"/>
+            <a:ext cx="2592288" cy="646331"/>
           </a:xfrm>
           <a:prstGeom prst="rect">
             <a:avLst/>
@@ -3999,8 +4065,27 @@
           <a:p>
             <a:pPr algn="ctr"/>
             <a:r>
-              <a:rPr lang="en-US" altLang="ko-KR" dirty="0" err="1" smtClean="0"/>
-              <a:t>ReadyDrawUI</a:t>
+              <a:rPr lang="en-US" altLang="ko-KR" dirty="0" err="1"/>
+              <a:t>Py</a:t>
+            </a:r>
+            <a:r>
+              <a:rPr lang="en-US" altLang="ko-KR" dirty="0"/>
+              <a:t> Catch Mind</a:t>
+            </a:r>
+          </a:p>
+          <a:p>
+            <a:pPr algn="ctr"/>
+            <a:r>
+              <a:rPr lang="en-US" altLang="ko-KR" dirty="0"/>
+              <a:t>(</a:t>
+            </a:r>
+            <a:r>
+              <a:rPr lang="en-US" altLang="ko-KR" dirty="0" err="1"/>
+              <a:t>MainUI</a:t>
+            </a:r>
+            <a:r>
+              <a:rPr lang="en-US" altLang="ko-KR" dirty="0"/>
+              <a:t>)</a:t>
             </a:r>
             <a:endParaRPr lang="ko-KR" altLang="en-US" dirty="0"/>
           </a:p>
@@ -4014,8 +4099,8 @@
         </p:nvSpPr>
         <p:spPr>
           <a:xfrm>
-            <a:off x="3563888" y="3392996"/>
-            <a:ext cx="2664296" cy="1224136"/>
+            <a:off x="5148064" y="2492896"/>
+            <a:ext cx="1512168" cy="1224136"/>
           </a:xfrm>
           <a:prstGeom prst="roundRect">
             <a:avLst/>
@@ -4043,16 +4128,8 @@
           <a:p>
             <a:pPr algn="ctr"/>
             <a:r>
-              <a:rPr lang="ko-KR" altLang="en-US" dirty="0" err="1" smtClean="0"/>
-              <a:t>그리러가기</a:t>
-            </a:r>
-            <a:endParaRPr lang="en-US" altLang="ko-KR" dirty="0" smtClean="0"/>
-          </a:p>
-          <a:p>
-            <a:pPr algn="ctr"/>
-            <a:r>
-              <a:rPr lang="en-US" altLang="ko-KR" dirty="0" smtClean="0"/>
-              <a:t>Ready</a:t>
+              <a:rPr lang="en-US" altLang="ko-KR" dirty="0"/>
+              <a:t>Start</a:t>
             </a:r>
             <a:endParaRPr lang="ko-KR" altLang="en-US" dirty="0"/>
           </a:p>
@@ -4066,8 +4143,8 @@
         </p:nvSpPr>
         <p:spPr>
           <a:xfrm>
-            <a:off x="494965" y="2389240"/>
-            <a:ext cx="1556755" cy="3488031"/>
+            <a:off x="2699792" y="2492896"/>
+            <a:ext cx="1728192" cy="1296144"/>
           </a:xfrm>
           <a:prstGeom prst="roundRect">
             <a:avLst/>
@@ -4095,8 +4172,23 @@
           <a:p>
             <a:pPr algn="ctr"/>
             <a:r>
-              <a:rPr lang="en-US" altLang="ko-KR" dirty="0" err="1" smtClean="0"/>
-              <a:t>ScoreBoard</a:t>
+              <a:rPr lang="ko-KR" altLang="en-US" dirty="0"/>
+              <a:t>인원</a:t>
+            </a:r>
+            <a:endParaRPr lang="en-US" altLang="ko-KR" dirty="0"/>
+          </a:p>
+          <a:p>
+            <a:pPr algn="ctr"/>
+            <a:r>
+              <a:rPr lang="en-US" altLang="ko-KR" dirty="0"/>
+              <a:t>2~4</a:t>
+            </a:r>
+          </a:p>
+          <a:p>
+            <a:pPr algn="ctr"/>
+            <a:r>
+              <a:rPr lang="en-US" altLang="ko-KR" dirty="0" err="1"/>
+              <a:t>SetPlayer</a:t>
             </a:r>
             <a:endParaRPr lang="ko-KR" altLang="en-US" dirty="0"/>
           </a:p>
@@ -4139,7 +4231,7 @@
           <a:p>
             <a:pPr algn="ctr"/>
             <a:r>
-              <a:rPr lang="en-US" altLang="ko-KR" dirty="0" smtClean="0"/>
+              <a:rPr lang="en-US" altLang="ko-KR" dirty="0"/>
               <a:t>Quit</a:t>
             </a:r>
             <a:endParaRPr lang="ko-KR" altLang="en-US" dirty="0"/>
@@ -4154,8 +4246,8 @@
         </p:nvSpPr>
         <p:spPr>
           <a:xfrm>
-            <a:off x="470352" y="836712"/>
-            <a:ext cx="1581368" cy="648072"/>
+            <a:off x="467544" y="908720"/>
+            <a:ext cx="792088" cy="486351"/>
           </a:xfrm>
           <a:prstGeom prst="roundRect">
             <a:avLst/>
@@ -4183,8 +4275,8 @@
           <a:p>
             <a:pPr algn="ctr"/>
             <a:r>
-              <a:rPr lang="en-US" altLang="ko-KR" dirty="0" smtClean="0"/>
-              <a:t>ReGetWord</a:t>
+              <a:rPr lang="en-US" altLang="ko-KR" dirty="0"/>
+              <a:t>Help</a:t>
             </a:r>
             <a:endParaRPr lang="ko-KR" altLang="en-US" dirty="0"/>
           </a:p>
@@ -4198,8 +4290,8 @@
         </p:nvSpPr>
         <p:spPr>
           <a:xfrm>
-            <a:off x="2411760" y="1628800"/>
-            <a:ext cx="5256584" cy="760440"/>
+            <a:off x="2267744" y="4117345"/>
+            <a:ext cx="4680520" cy="504056"/>
           </a:xfrm>
           <a:prstGeom prst="roundRect">
             <a:avLst/>
@@ -4227,8 +4319,24 @@
           <a:p>
             <a:pPr algn="ctr"/>
             <a:r>
-              <a:rPr lang="en-US" altLang="ko-KR" dirty="0" err="1" smtClean="0"/>
-              <a:t>GetWord</a:t>
+              <a:rPr lang="en-US" altLang="ko-KR" dirty="0"/>
+              <a:t>*</a:t>
+            </a:r>
+            <a:r>
+              <a:rPr lang="ko-KR" altLang="en-US" dirty="0"/>
+              <a:t>인원을 </a:t>
+            </a:r>
+            <a:r>
+              <a:rPr lang="en-US" altLang="ko-KR" dirty="0"/>
+              <a:t>2~4</a:t>
+            </a:r>
+            <a:r>
+              <a:rPr lang="ko-KR" altLang="en-US" dirty="0"/>
+              <a:t>명으로 지정해주세요</a:t>
+            </a:r>
+            <a:r>
+              <a:rPr lang="en-US" altLang="ko-KR" dirty="0"/>
+              <a:t>.</a:t>
             </a:r>
             <a:endParaRPr lang="ko-KR" altLang="en-US" dirty="0"/>
           </a:p>
@@ -4237,7 +4345,7 @@
     </p:spTree>
     <p:extLst>
       <p:ext uri="{BB962C8B-B14F-4D97-AF65-F5344CB8AC3E}">
-        <p14:creationId xmlns:p14="http://schemas.microsoft.com/office/powerpoint/2010/main" val="2826410569"/>
+        <p14:creationId xmlns:p14="http://schemas.microsoft.com/office/powerpoint/2010/main" val="1110847625"/>
       </p:ext>
     </p:extLst>
   </p:cSld>
@@ -4312,7 +4420,7 @@
         </p:nvSpPr>
         <p:spPr>
           <a:xfrm>
-            <a:off x="3311860" y="976082"/>
+            <a:off x="3743908" y="1042187"/>
             <a:ext cx="2592288" cy="369332"/>
           </a:xfrm>
           <a:prstGeom prst="rect">
@@ -4328,8 +4436,8 @@
           <a:p>
             <a:pPr algn="ctr"/>
             <a:r>
-              <a:rPr lang="en-US" altLang="ko-KR" dirty="0" err="1" smtClean="0"/>
-              <a:t>DrawingUI</a:t>
+              <a:rPr lang="en-US" altLang="ko-KR" dirty="0" err="1"/>
+              <a:t>ReadyDrawUI</a:t>
             </a:r>
             <a:endParaRPr lang="ko-KR" altLang="en-US" dirty="0"/>
           </a:p>
@@ -4343,8 +4451,8 @@
         </p:nvSpPr>
         <p:spPr>
           <a:xfrm>
-            <a:off x="7596336" y="5448996"/>
-            <a:ext cx="1080120" cy="440361"/>
+            <a:off x="3563888" y="3392996"/>
+            <a:ext cx="2664296" cy="1224136"/>
           </a:xfrm>
           <a:prstGeom prst="roundRect">
             <a:avLst/>
@@ -4372,8 +4480,16 @@
           <a:p>
             <a:pPr algn="ctr"/>
             <a:r>
-              <a:rPr lang="en-US" altLang="ko-KR" dirty="0" smtClean="0"/>
-              <a:t>Eraser</a:t>
+              <a:rPr lang="ko-KR" altLang="en-US" dirty="0" err="1"/>
+              <a:t>그리러가기</a:t>
+            </a:r>
+            <a:endParaRPr lang="en-US" altLang="ko-KR" dirty="0"/>
+          </a:p>
+          <a:p>
+            <a:pPr algn="ctr"/>
+            <a:r>
+              <a:rPr lang="en-US" altLang="ko-KR" dirty="0"/>
+              <a:t>Ready</a:t>
             </a:r>
             <a:endParaRPr lang="ko-KR" altLang="en-US" dirty="0"/>
           </a:p>
@@ -4381,14 +4497,14 @@
       </p:sp>
       <p:sp>
         <p:nvSpPr>
-          <p:cNvPr id="8" name="모서리가 둥근 직사각형 7"/>
+          <p:cNvPr id="7" name="모서리가 둥근 직사각형 6"/>
           <p:cNvSpPr/>
           <p:nvPr/>
         </p:nvSpPr>
         <p:spPr>
           <a:xfrm>
-            <a:off x="7812360" y="836712"/>
-            <a:ext cx="864096" cy="648072"/>
+            <a:off x="494965" y="2389240"/>
+            <a:ext cx="1556755" cy="3488031"/>
           </a:xfrm>
           <a:prstGeom prst="roundRect">
             <a:avLst/>
@@ -4416,8 +4532,8 @@
           <a:p>
             <a:pPr algn="ctr"/>
             <a:r>
-              <a:rPr lang="en-US" altLang="ko-KR" dirty="0" smtClean="0"/>
-              <a:t>Quit</a:t>
+              <a:rPr lang="en-US" altLang="ko-KR" dirty="0" err="1"/>
+              <a:t>ScoreBoard</a:t>
             </a:r>
             <a:endParaRPr lang="ko-KR" altLang="en-US" dirty="0"/>
           </a:p>
@@ -4425,14 +4541,14 @@
       </p:sp>
       <p:sp>
         <p:nvSpPr>
-          <p:cNvPr id="9" name="모서리가 둥근 직사각형 8"/>
+          <p:cNvPr id="8" name="모서리가 둥근 직사각형 7"/>
           <p:cNvSpPr/>
           <p:nvPr/>
         </p:nvSpPr>
         <p:spPr>
           <a:xfrm>
-            <a:off x="467544" y="836712"/>
-            <a:ext cx="954105" cy="558359"/>
+            <a:off x="7812360" y="836712"/>
+            <a:ext cx="864096" cy="648072"/>
           </a:xfrm>
           <a:prstGeom prst="roundRect">
             <a:avLst/>
@@ -4460,8 +4576,8 @@
           <a:p>
             <a:pPr algn="ctr"/>
             <a:r>
-              <a:rPr lang="en-US" altLang="ko-KR" dirty="0" smtClean="0"/>
-              <a:t>Report</a:t>
+              <a:rPr lang="en-US" altLang="ko-KR" dirty="0"/>
+              <a:t>Quit</a:t>
             </a:r>
             <a:endParaRPr lang="ko-KR" altLang="en-US" dirty="0"/>
           </a:p>
@@ -4469,14 +4585,14 @@
       </p:sp>
       <p:sp>
         <p:nvSpPr>
-          <p:cNvPr id="10" name="모서리가 둥근 직사각형 9"/>
+          <p:cNvPr id="9" name="모서리가 둥근 직사각형 8"/>
           <p:cNvSpPr/>
           <p:nvPr/>
         </p:nvSpPr>
         <p:spPr>
           <a:xfrm>
-            <a:off x="1421649" y="1467393"/>
-            <a:ext cx="6372709" cy="3816424"/>
+            <a:off x="470352" y="836712"/>
+            <a:ext cx="1581368" cy="648072"/>
           </a:xfrm>
           <a:prstGeom prst="roundRect">
             <a:avLst/>
@@ -4504,8 +4620,8 @@
           <a:p>
             <a:pPr algn="ctr"/>
             <a:r>
-              <a:rPr lang="ko-KR" altLang="en-US" dirty="0" smtClean="0"/>
-              <a:t>그리는 부분</a:t>
+              <a:rPr lang="en-US" altLang="ko-KR" dirty="0"/>
+              <a:t>ReGetWord</a:t>
             </a:r>
             <a:endParaRPr lang="ko-KR" altLang="en-US" dirty="0"/>
           </a:p>
@@ -4513,14 +4629,14 @@
       </p:sp>
       <p:sp>
         <p:nvSpPr>
-          <p:cNvPr id="11" name="모서리가 둥근 직사각형 10"/>
+          <p:cNvPr id="10" name="모서리가 둥근 직사각형 9"/>
           <p:cNvSpPr/>
           <p:nvPr/>
         </p:nvSpPr>
         <p:spPr>
           <a:xfrm>
-            <a:off x="6012160" y="5448995"/>
-            <a:ext cx="1080120" cy="440361"/>
+            <a:off x="2411760" y="1628800"/>
+            <a:ext cx="5256584" cy="760440"/>
           </a:xfrm>
           <a:prstGeom prst="roundRect">
             <a:avLst/>
@@ -4548,52 +4664,8 @@
           <a:p>
             <a:pPr algn="ctr"/>
             <a:r>
-              <a:rPr lang="en-US" altLang="ko-KR" dirty="0" smtClean="0"/>
-              <a:t>Sizes</a:t>
-            </a:r>
-            <a:endParaRPr lang="ko-KR" altLang="en-US" dirty="0"/>
-          </a:p>
-        </p:txBody>
-      </p:sp>
-      <p:sp>
-        <p:nvSpPr>
-          <p:cNvPr id="12" name="모서리가 둥근 직사각형 11"/>
-          <p:cNvSpPr/>
-          <p:nvPr/>
-        </p:nvSpPr>
-        <p:spPr>
-          <a:xfrm>
-            <a:off x="611560" y="5447741"/>
-            <a:ext cx="2448272" cy="440361"/>
-          </a:xfrm>
-          <a:prstGeom prst="roundRect">
-            <a:avLst/>
-          </a:prstGeom>
-        </p:spPr>
-        <p:style>
-          <a:lnRef idx="2">
-            <a:schemeClr val="accent1">
-              <a:shade val="50000"/>
-            </a:schemeClr>
-          </a:lnRef>
-          <a:fillRef idx="1">
-            <a:schemeClr val="accent1"/>
-          </a:fillRef>
-          <a:effectRef idx="0">
-            <a:schemeClr val="accent1"/>
-          </a:effectRef>
-          <a:fontRef idx="minor">
-            <a:schemeClr val="lt1"/>
-          </a:fontRef>
-        </p:style>
-        <p:txBody>
-          <a:bodyPr rtlCol="0" anchor="ctr"/>
-          <a:lstStyle/>
-          <a:p>
-            <a:pPr algn="ctr"/>
-            <a:r>
-              <a:rPr lang="en-US" altLang="ko-KR" dirty="0" smtClean="0"/>
-              <a:t>Colors</a:t>
+              <a:rPr lang="en-US" altLang="ko-KR" dirty="0" err="1"/>
+              <a:t>GetWord</a:t>
             </a:r>
             <a:endParaRPr lang="ko-KR" altLang="en-US" dirty="0"/>
           </a:p>
@@ -4602,7 +4674,7 @@
     </p:spTree>
     <p:extLst>
       <p:ext uri="{BB962C8B-B14F-4D97-AF65-F5344CB8AC3E}">
-        <p14:creationId xmlns:p14="http://schemas.microsoft.com/office/powerpoint/2010/main" val="4125072326"/>
+        <p14:creationId xmlns:p14="http://schemas.microsoft.com/office/powerpoint/2010/main" val="2826410569"/>
       </p:ext>
     </p:extLst>
   </p:cSld>
@@ -4677,7 +4749,7 @@
         </p:nvSpPr>
         <p:spPr>
           <a:xfrm>
-            <a:off x="3311860" y="1025739"/>
+            <a:off x="3311860" y="976082"/>
             <a:ext cx="2592288" cy="369332"/>
           </a:xfrm>
           <a:prstGeom prst="rect">
@@ -4693,8 +4765,8 @@
           <a:p>
             <a:pPr algn="ctr"/>
             <a:r>
-              <a:rPr lang="en-US" altLang="ko-KR" dirty="0" err="1" smtClean="0"/>
-              <a:t>GuessUI</a:t>
+              <a:rPr lang="en-US" altLang="ko-KR" dirty="0" err="1"/>
+              <a:t>DrawingUI</a:t>
             </a:r>
             <a:endParaRPr lang="ko-KR" altLang="en-US" dirty="0"/>
           </a:p>
@@ -4708,8 +4780,8 @@
         </p:nvSpPr>
         <p:spPr>
           <a:xfrm>
-            <a:off x="7279253" y="1606254"/>
-            <a:ext cx="1512168" cy="3471980"/>
+            <a:off x="7596336" y="5448996"/>
+            <a:ext cx="1080120" cy="440361"/>
           </a:xfrm>
           <a:prstGeom prst="roundRect">
             <a:avLst/>
@@ -4737,15 +4809,8 @@
           <a:p>
             <a:pPr algn="ctr"/>
             <a:r>
-              <a:rPr lang="en-US" altLang="ko-KR" dirty="0" smtClean="0"/>
-              <a:t>Score</a:t>
-            </a:r>
-          </a:p>
-          <a:p>
-            <a:pPr algn="ctr"/>
-            <a:r>
-              <a:rPr lang="en-US" altLang="ko-KR" dirty="0" smtClean="0"/>
-              <a:t>Board</a:t>
+              <a:rPr lang="en-US" altLang="ko-KR" dirty="0"/>
+              <a:t>Eraser</a:t>
             </a:r>
             <a:endParaRPr lang="ko-KR" altLang="en-US" dirty="0"/>
           </a:p>
@@ -4753,14 +4818,14 @@
       </p:sp>
       <p:sp>
         <p:nvSpPr>
-          <p:cNvPr id="7" name="모서리가 둥근 직사각형 6"/>
+          <p:cNvPr id="8" name="모서리가 둥근 직사각형 7"/>
           <p:cNvSpPr/>
           <p:nvPr/>
         </p:nvSpPr>
         <p:spPr>
           <a:xfrm>
-            <a:off x="494965" y="1612749"/>
-            <a:ext cx="1728192" cy="3488031"/>
+            <a:off x="7812360" y="836712"/>
+            <a:ext cx="864096" cy="648072"/>
           </a:xfrm>
           <a:prstGeom prst="roundRect">
             <a:avLst/>
@@ -4788,8 +4853,8 @@
           <a:p>
             <a:pPr algn="ctr"/>
             <a:r>
-              <a:rPr lang="en-US" altLang="ko-KR" dirty="0" err="1" smtClean="0"/>
-              <a:t>CheckPlayer</a:t>
+              <a:rPr lang="en-US" altLang="ko-KR" dirty="0"/>
+              <a:t>Quit</a:t>
             </a:r>
             <a:endParaRPr lang="ko-KR" altLang="en-US" dirty="0"/>
           </a:p>
@@ -4797,14 +4862,14 @@
       </p:sp>
       <p:sp>
         <p:nvSpPr>
-          <p:cNvPr id="8" name="모서리가 둥근 직사각형 7"/>
+          <p:cNvPr id="9" name="모서리가 둥근 직사각형 8"/>
           <p:cNvSpPr/>
           <p:nvPr/>
         </p:nvSpPr>
         <p:spPr>
           <a:xfrm>
-            <a:off x="7812360" y="836712"/>
-            <a:ext cx="864096" cy="648072"/>
+            <a:off x="467544" y="836712"/>
+            <a:ext cx="954105" cy="558359"/>
           </a:xfrm>
           <a:prstGeom prst="roundRect">
             <a:avLst/>
@@ -4832,8 +4897,8 @@
           <a:p>
             <a:pPr algn="ctr"/>
             <a:r>
-              <a:rPr lang="en-US" altLang="ko-KR" dirty="0" smtClean="0"/>
-              <a:t>Quit</a:t>
+              <a:rPr lang="en-US" altLang="ko-KR" dirty="0"/>
+              <a:t>Report</a:t>
             </a:r>
             <a:endParaRPr lang="ko-KR" altLang="en-US" dirty="0"/>
           </a:p>
@@ -4841,14 +4906,14 @@
       </p:sp>
       <p:sp>
         <p:nvSpPr>
-          <p:cNvPr id="9" name="모서리가 둥근 직사각형 8"/>
+          <p:cNvPr id="10" name="모서리가 둥근 직사각형 9"/>
           <p:cNvSpPr/>
           <p:nvPr/>
         </p:nvSpPr>
         <p:spPr>
           <a:xfrm>
-            <a:off x="467544" y="908720"/>
-            <a:ext cx="2088232" cy="486351"/>
+            <a:off x="1421649" y="1467393"/>
+            <a:ext cx="6372709" cy="3816424"/>
           </a:xfrm>
           <a:prstGeom prst="roundRect">
             <a:avLst/>
@@ -4876,30 +4941,22 @@
           <a:p>
             <a:pPr algn="ctr"/>
             <a:r>
-              <a:rPr lang="en-US" altLang="ko-KR" dirty="0" smtClean="0"/>
-              <a:t>Return</a:t>
-            </a:r>
-          </a:p>
-          <a:p>
-            <a:pPr algn="ctr"/>
-            <a:r>
-              <a:rPr lang="en-US" altLang="ko-KR" dirty="0" smtClean="0"/>
-              <a:t>Drawing</a:t>
-            </a:r>
-            <a:endParaRPr lang="ko-KR" altLang="en-US" dirty="0"/>
-          </a:p>
-        </p:txBody>
-      </p:sp>
-      <p:sp>
-        <p:nvSpPr>
-          <p:cNvPr id="10" name="모서리가 둥근 직사각형 9"/>
+              <a:rPr lang="ko-KR" altLang="en-US" dirty="0"/>
+              <a:t>그리는 부분</a:t>
+            </a:r>
+          </a:p>
+        </p:txBody>
+      </p:sp>
+      <p:sp>
+        <p:nvSpPr>
+          <p:cNvPr id="11" name="모서리가 둥근 직사각형 10"/>
           <p:cNvSpPr/>
           <p:nvPr/>
         </p:nvSpPr>
         <p:spPr>
           <a:xfrm>
-            <a:off x="2411760" y="1628800"/>
-            <a:ext cx="4680520" cy="3384376"/>
+            <a:off x="6012160" y="5448995"/>
+            <a:ext cx="1080120" cy="440361"/>
           </a:xfrm>
           <a:prstGeom prst="roundRect">
             <a:avLst/>
@@ -4927,12 +4984,8 @@
           <a:p>
             <a:pPr algn="ctr"/>
             <a:r>
-              <a:rPr lang="ko-KR" altLang="en-US" dirty="0" smtClean="0"/>
-              <a:t>그림부분</a:t>
-            </a:r>
-            <a:r>
-              <a:rPr lang="en-US" altLang="ko-KR" dirty="0" smtClean="0"/>
-              <a:t>?</a:t>
+              <a:rPr lang="en-US" altLang="ko-KR" dirty="0"/>
+              <a:t>Sizes</a:t>
             </a:r>
             <a:endParaRPr lang="ko-KR" altLang="en-US" dirty="0"/>
           </a:p>
@@ -4940,14 +4993,14 @@
       </p:sp>
       <p:sp>
         <p:nvSpPr>
-          <p:cNvPr id="2" name="모서리가 둥근 직사각형 1"/>
+          <p:cNvPr id="12" name="모서리가 둥근 직사각형 11"/>
           <p:cNvSpPr/>
           <p:nvPr/>
         </p:nvSpPr>
         <p:spPr>
           <a:xfrm>
-            <a:off x="2555776" y="5229200"/>
-            <a:ext cx="4464496" cy="576064"/>
+            <a:off x="611560" y="5447741"/>
+            <a:ext cx="2448272" cy="440361"/>
           </a:xfrm>
           <a:prstGeom prst="roundRect">
             <a:avLst/>
@@ -4975,8 +5028,8 @@
           <a:p>
             <a:pPr algn="ctr"/>
             <a:r>
-              <a:rPr lang="en-US" altLang="ko-KR" dirty="0" err="1" smtClean="0"/>
-              <a:t>CheckAnswer</a:t>
+              <a:rPr lang="en-US" altLang="ko-KR" dirty="0"/>
+              <a:t>Colors</a:t>
             </a:r>
             <a:endParaRPr lang="ko-KR" altLang="en-US" dirty="0"/>
           </a:p>
@@ -4985,7 +5038,7 @@
     </p:spTree>
     <p:extLst>
       <p:ext uri="{BB962C8B-B14F-4D97-AF65-F5344CB8AC3E}">
-        <p14:creationId xmlns:p14="http://schemas.microsoft.com/office/powerpoint/2010/main" val="1194279584"/>
+        <p14:creationId xmlns:p14="http://schemas.microsoft.com/office/powerpoint/2010/main" val="4125072326"/>
       </p:ext>
     </p:extLst>
   </p:cSld>
@@ -5076,8 +5129,8 @@
           <a:p>
             <a:pPr algn="ctr"/>
             <a:r>
-              <a:rPr lang="en-US" altLang="ko-KR" dirty="0" err="1" smtClean="0"/>
-              <a:t>ResultUI</a:t>
+              <a:rPr lang="en-US" altLang="ko-KR" dirty="0" err="1"/>
+              <a:t>GuessUI</a:t>
             </a:r>
             <a:endParaRPr lang="ko-KR" altLang="en-US" dirty="0"/>
           </a:p>
@@ -5091,8 +5144,8 @@
         </p:nvSpPr>
         <p:spPr>
           <a:xfrm>
-            <a:off x="2331809" y="1613652"/>
-            <a:ext cx="4552390" cy="3471980"/>
+            <a:off x="7279253" y="1606254"/>
+            <a:ext cx="1512168" cy="3471980"/>
           </a:xfrm>
           <a:prstGeom prst="roundRect">
             <a:avLst/>
@@ -5120,14 +5173,14 @@
           <a:p>
             <a:pPr algn="ctr"/>
             <a:r>
-              <a:rPr lang="en-US" altLang="ko-KR" dirty="0" smtClean="0"/>
+              <a:rPr lang="en-US" altLang="ko-KR" dirty="0"/>
               <a:t>Score</a:t>
             </a:r>
           </a:p>
           <a:p>
             <a:pPr algn="ctr"/>
             <a:r>
-              <a:rPr lang="en-US" altLang="ko-KR" dirty="0" smtClean="0"/>
+              <a:rPr lang="en-US" altLang="ko-KR" dirty="0"/>
               <a:t>Board</a:t>
             </a:r>
             <a:endParaRPr lang="ko-KR" altLang="en-US" dirty="0"/>
@@ -5136,14 +5189,14 @@
       </p:sp>
       <p:sp>
         <p:nvSpPr>
-          <p:cNvPr id="8" name="모서리가 둥근 직사각형 7"/>
+          <p:cNvPr id="7" name="모서리가 둥근 직사각형 6"/>
           <p:cNvSpPr/>
           <p:nvPr/>
         </p:nvSpPr>
         <p:spPr>
           <a:xfrm>
-            <a:off x="7812360" y="836712"/>
-            <a:ext cx="864096" cy="648072"/>
+            <a:off x="494965" y="1612749"/>
+            <a:ext cx="1728192" cy="3488031"/>
           </a:xfrm>
           <a:prstGeom prst="roundRect">
             <a:avLst/>
@@ -5171,8 +5224,8 @@
           <a:p>
             <a:pPr algn="ctr"/>
             <a:r>
-              <a:rPr lang="en-US" altLang="ko-KR" dirty="0" smtClean="0"/>
-              <a:t>Quit</a:t>
+              <a:rPr lang="en-US" altLang="ko-KR" dirty="0" err="1"/>
+              <a:t>CheckPlayer</a:t>
             </a:r>
             <a:endParaRPr lang="ko-KR" altLang="en-US" dirty="0"/>
           </a:p>
@@ -5180,14 +5233,14 @@
       </p:sp>
       <p:sp>
         <p:nvSpPr>
-          <p:cNvPr id="9" name="모서리가 둥근 직사각형 8"/>
+          <p:cNvPr id="8" name="모서리가 둥근 직사각형 7"/>
           <p:cNvSpPr/>
           <p:nvPr/>
         </p:nvSpPr>
         <p:spPr>
           <a:xfrm>
-            <a:off x="467544" y="836712"/>
-            <a:ext cx="1044116" cy="558359"/>
+            <a:off x="7812360" y="836712"/>
+            <a:ext cx="864096" cy="648072"/>
           </a:xfrm>
           <a:prstGeom prst="roundRect">
             <a:avLst/>
@@ -5215,7 +5268,390 @@
           <a:p>
             <a:pPr algn="ctr"/>
             <a:r>
-              <a:rPr lang="en-US" altLang="ko-KR" dirty="0" smtClean="0"/>
+              <a:rPr lang="en-US" altLang="ko-KR" dirty="0"/>
+              <a:t>Quit</a:t>
+            </a:r>
+            <a:endParaRPr lang="ko-KR" altLang="en-US" dirty="0"/>
+          </a:p>
+        </p:txBody>
+      </p:sp>
+      <p:sp>
+        <p:nvSpPr>
+          <p:cNvPr id="9" name="모서리가 둥근 직사각형 8"/>
+          <p:cNvSpPr/>
+          <p:nvPr/>
+        </p:nvSpPr>
+        <p:spPr>
+          <a:xfrm>
+            <a:off x="467544" y="908720"/>
+            <a:ext cx="2088232" cy="486351"/>
+          </a:xfrm>
+          <a:prstGeom prst="roundRect">
+            <a:avLst/>
+          </a:prstGeom>
+        </p:spPr>
+        <p:style>
+          <a:lnRef idx="2">
+            <a:schemeClr val="accent1">
+              <a:shade val="50000"/>
+            </a:schemeClr>
+          </a:lnRef>
+          <a:fillRef idx="1">
+            <a:schemeClr val="accent1"/>
+          </a:fillRef>
+          <a:effectRef idx="0">
+            <a:schemeClr val="accent1"/>
+          </a:effectRef>
+          <a:fontRef idx="minor">
+            <a:schemeClr val="lt1"/>
+          </a:fontRef>
+        </p:style>
+        <p:txBody>
+          <a:bodyPr rtlCol="0" anchor="ctr"/>
+          <a:lstStyle/>
+          <a:p>
+            <a:pPr algn="ctr"/>
+            <a:r>
+              <a:rPr lang="en-US" altLang="ko-KR" dirty="0"/>
+              <a:t>Return</a:t>
+            </a:r>
+          </a:p>
+          <a:p>
+            <a:pPr algn="ctr"/>
+            <a:r>
+              <a:rPr lang="en-US" altLang="ko-KR" dirty="0"/>
+              <a:t>Drawing</a:t>
+            </a:r>
+            <a:endParaRPr lang="ko-KR" altLang="en-US" dirty="0"/>
+          </a:p>
+        </p:txBody>
+      </p:sp>
+      <p:sp>
+        <p:nvSpPr>
+          <p:cNvPr id="10" name="모서리가 둥근 직사각형 9"/>
+          <p:cNvSpPr/>
+          <p:nvPr/>
+        </p:nvSpPr>
+        <p:spPr>
+          <a:xfrm>
+            <a:off x="2411760" y="1628800"/>
+            <a:ext cx="4680520" cy="3384376"/>
+          </a:xfrm>
+          <a:prstGeom prst="roundRect">
+            <a:avLst/>
+          </a:prstGeom>
+        </p:spPr>
+        <p:style>
+          <a:lnRef idx="2">
+            <a:schemeClr val="accent1">
+              <a:shade val="50000"/>
+            </a:schemeClr>
+          </a:lnRef>
+          <a:fillRef idx="1">
+            <a:schemeClr val="accent1"/>
+          </a:fillRef>
+          <a:effectRef idx="0">
+            <a:schemeClr val="accent1"/>
+          </a:effectRef>
+          <a:fontRef idx="minor">
+            <a:schemeClr val="lt1"/>
+          </a:fontRef>
+        </p:style>
+        <p:txBody>
+          <a:bodyPr rtlCol="0" anchor="ctr"/>
+          <a:lstStyle/>
+          <a:p>
+            <a:pPr algn="ctr"/>
+            <a:r>
+              <a:rPr lang="ko-KR" altLang="en-US" dirty="0"/>
+              <a:t>그림부분</a:t>
+            </a:r>
+            <a:r>
+              <a:rPr lang="en-US" altLang="ko-KR" dirty="0"/>
+              <a:t>?</a:t>
+            </a:r>
+            <a:endParaRPr lang="ko-KR" altLang="en-US" dirty="0"/>
+          </a:p>
+        </p:txBody>
+      </p:sp>
+      <p:sp>
+        <p:nvSpPr>
+          <p:cNvPr id="2" name="모서리가 둥근 직사각형 1"/>
+          <p:cNvSpPr/>
+          <p:nvPr/>
+        </p:nvSpPr>
+        <p:spPr>
+          <a:xfrm>
+            <a:off x="2555776" y="5229200"/>
+            <a:ext cx="4464496" cy="576064"/>
+          </a:xfrm>
+          <a:prstGeom prst="roundRect">
+            <a:avLst/>
+          </a:prstGeom>
+        </p:spPr>
+        <p:style>
+          <a:lnRef idx="2">
+            <a:schemeClr val="accent1">
+              <a:shade val="50000"/>
+            </a:schemeClr>
+          </a:lnRef>
+          <a:fillRef idx="1">
+            <a:schemeClr val="accent1"/>
+          </a:fillRef>
+          <a:effectRef idx="0">
+            <a:schemeClr val="accent1"/>
+          </a:effectRef>
+          <a:fontRef idx="minor">
+            <a:schemeClr val="lt1"/>
+          </a:fontRef>
+        </p:style>
+        <p:txBody>
+          <a:bodyPr rtlCol="0" anchor="ctr"/>
+          <a:lstStyle/>
+          <a:p>
+            <a:pPr algn="ctr"/>
+            <a:r>
+              <a:rPr lang="en-US" altLang="ko-KR" dirty="0" err="1"/>
+              <a:t>CheckAnswer</a:t>
+            </a:r>
+            <a:endParaRPr lang="ko-KR" altLang="en-US" dirty="0"/>
+          </a:p>
+        </p:txBody>
+      </p:sp>
+    </p:spTree>
+    <p:extLst>
+      <p:ext uri="{BB962C8B-B14F-4D97-AF65-F5344CB8AC3E}">
+        <p14:creationId xmlns:p14="http://schemas.microsoft.com/office/powerpoint/2010/main" val="1194279584"/>
+      </p:ext>
+    </p:extLst>
+  </p:cSld>
+  <p:clrMapOvr>
+    <a:masterClrMapping/>
+  </p:clrMapOvr>
+</p:sld>
+</file>
+
+<file path=ppt/slides/slide7.xml><?xml version="1.0" encoding="utf-8"?>
+<p:sld xmlns:a="http://schemas.openxmlformats.org/drawingml/2006/main" xmlns:r="http://schemas.openxmlformats.org/officeDocument/2006/relationships" xmlns:p="http://schemas.openxmlformats.org/presentationml/2006/main">
+  <p:cSld>
+    <p:spTree>
+      <p:nvGrpSpPr>
+        <p:cNvPr id="1" name=""/>
+        <p:cNvGrpSpPr/>
+        <p:nvPr/>
+      </p:nvGrpSpPr>
+      <p:grpSpPr>
+        <a:xfrm>
+          <a:off x="0" y="0"/>
+          <a:ext cx="0" cy="0"/>
+          <a:chOff x="0" y="0"/>
+          <a:chExt cx="0" cy="0"/>
+        </a:xfrm>
+      </p:grpSpPr>
+      <p:sp>
+        <p:nvSpPr>
+          <p:cNvPr id="4" name="직사각형 3"/>
+          <p:cNvSpPr/>
+          <p:nvPr/>
+        </p:nvSpPr>
+        <p:spPr>
+          <a:xfrm>
+            <a:off x="395536" y="764704"/>
+            <a:ext cx="8424936" cy="5256584"/>
+          </a:xfrm>
+          <a:prstGeom prst="rect">
+            <a:avLst/>
+          </a:prstGeom>
+        </p:spPr>
+        <p:style>
+          <a:lnRef idx="2">
+            <a:schemeClr val="accent1">
+              <a:shade val="50000"/>
+            </a:schemeClr>
+          </a:lnRef>
+          <a:fillRef idx="1">
+            <a:schemeClr val="accent1"/>
+          </a:fillRef>
+          <a:effectRef idx="0">
+            <a:schemeClr val="accent1"/>
+          </a:effectRef>
+          <a:fontRef idx="minor">
+            <a:schemeClr val="lt1"/>
+          </a:fontRef>
+        </p:style>
+        <p:txBody>
+          <a:bodyPr rtlCol="0" anchor="ctr"/>
+          <a:lstStyle/>
+          <a:p>
+            <a:pPr algn="ctr"/>
+            <a:endParaRPr lang="ko-KR" altLang="en-US"/>
+          </a:p>
+        </p:txBody>
+      </p:sp>
+      <p:sp>
+        <p:nvSpPr>
+          <p:cNvPr id="5" name="TextBox 4"/>
+          <p:cNvSpPr txBox="1"/>
+          <p:nvPr/>
+        </p:nvSpPr>
+        <p:spPr>
+          <a:xfrm>
+            <a:off x="3311860" y="1025739"/>
+            <a:ext cx="2592288" cy="369332"/>
+          </a:xfrm>
+          <a:prstGeom prst="rect">
+            <a:avLst/>
+          </a:prstGeom>
+          <a:noFill/>
+        </p:spPr>
+        <p:txBody>
+          <a:bodyPr wrap="square" rtlCol="0">
+            <a:spAutoFit/>
+          </a:bodyPr>
+          <a:lstStyle/>
+          <a:p>
+            <a:pPr algn="ctr"/>
+            <a:r>
+              <a:rPr lang="en-US" altLang="ko-KR" dirty="0" err="1"/>
+              <a:t>ResultUI</a:t>
+            </a:r>
+            <a:endParaRPr lang="ko-KR" altLang="en-US" dirty="0"/>
+          </a:p>
+        </p:txBody>
+      </p:sp>
+      <p:sp>
+        <p:nvSpPr>
+          <p:cNvPr id="6" name="모서리가 둥근 직사각형 5"/>
+          <p:cNvSpPr/>
+          <p:nvPr/>
+        </p:nvSpPr>
+        <p:spPr>
+          <a:xfrm>
+            <a:off x="2331809" y="1613652"/>
+            <a:ext cx="4552390" cy="3471980"/>
+          </a:xfrm>
+          <a:prstGeom prst="roundRect">
+            <a:avLst/>
+          </a:prstGeom>
+        </p:spPr>
+        <p:style>
+          <a:lnRef idx="2">
+            <a:schemeClr val="accent1">
+              <a:shade val="50000"/>
+            </a:schemeClr>
+          </a:lnRef>
+          <a:fillRef idx="1">
+            <a:schemeClr val="accent1"/>
+          </a:fillRef>
+          <a:effectRef idx="0">
+            <a:schemeClr val="accent1"/>
+          </a:effectRef>
+          <a:fontRef idx="minor">
+            <a:schemeClr val="lt1"/>
+          </a:fontRef>
+        </p:style>
+        <p:txBody>
+          <a:bodyPr rtlCol="0" anchor="ctr"/>
+          <a:lstStyle/>
+          <a:p>
+            <a:pPr algn="ctr"/>
+            <a:r>
+              <a:rPr lang="en-US" altLang="ko-KR" dirty="0"/>
+              <a:t>Score</a:t>
+            </a:r>
+          </a:p>
+          <a:p>
+            <a:pPr algn="ctr"/>
+            <a:r>
+              <a:rPr lang="en-US" altLang="ko-KR" dirty="0"/>
+              <a:t>Board</a:t>
+            </a:r>
+            <a:endParaRPr lang="ko-KR" altLang="en-US" dirty="0"/>
+          </a:p>
+        </p:txBody>
+      </p:sp>
+      <p:sp>
+        <p:nvSpPr>
+          <p:cNvPr id="8" name="모서리가 둥근 직사각형 7"/>
+          <p:cNvSpPr/>
+          <p:nvPr/>
+        </p:nvSpPr>
+        <p:spPr>
+          <a:xfrm>
+            <a:off x="7812360" y="836712"/>
+            <a:ext cx="864096" cy="648072"/>
+          </a:xfrm>
+          <a:prstGeom prst="roundRect">
+            <a:avLst/>
+          </a:prstGeom>
+        </p:spPr>
+        <p:style>
+          <a:lnRef idx="2">
+            <a:schemeClr val="accent1">
+              <a:shade val="50000"/>
+            </a:schemeClr>
+          </a:lnRef>
+          <a:fillRef idx="1">
+            <a:schemeClr val="accent1"/>
+          </a:fillRef>
+          <a:effectRef idx="0">
+            <a:schemeClr val="accent1"/>
+          </a:effectRef>
+          <a:fontRef idx="minor">
+            <a:schemeClr val="lt1"/>
+          </a:fontRef>
+        </p:style>
+        <p:txBody>
+          <a:bodyPr rtlCol="0" anchor="ctr"/>
+          <a:lstStyle/>
+          <a:p>
+            <a:pPr algn="ctr"/>
+            <a:r>
+              <a:rPr lang="en-US" altLang="ko-KR" dirty="0"/>
+              <a:t>Quit</a:t>
+            </a:r>
+            <a:endParaRPr lang="ko-KR" altLang="en-US" dirty="0"/>
+          </a:p>
+        </p:txBody>
+      </p:sp>
+      <p:sp>
+        <p:nvSpPr>
+          <p:cNvPr id="9" name="모서리가 둥근 직사각형 8"/>
+          <p:cNvSpPr/>
+          <p:nvPr/>
+        </p:nvSpPr>
+        <p:spPr>
+          <a:xfrm>
+            <a:off x="467544" y="836712"/>
+            <a:ext cx="1044116" cy="558359"/>
+          </a:xfrm>
+          <a:prstGeom prst="roundRect">
+            <a:avLst/>
+          </a:prstGeom>
+        </p:spPr>
+        <p:style>
+          <a:lnRef idx="2">
+            <a:schemeClr val="accent1">
+              <a:shade val="50000"/>
+            </a:schemeClr>
+          </a:lnRef>
+          <a:fillRef idx="1">
+            <a:schemeClr val="accent1"/>
+          </a:fillRef>
+          <a:effectRef idx="0">
+            <a:schemeClr val="accent1"/>
+          </a:effectRef>
+          <a:fontRef idx="minor">
+            <a:schemeClr val="lt1"/>
+          </a:fontRef>
+        </p:style>
+        <p:txBody>
+          <a:bodyPr rtlCol="0" anchor="ctr"/>
+          <a:lstStyle/>
+          <a:p>
+            <a:pPr algn="ctr"/>
+            <a:r>
+              <a:rPr lang="en-US" altLang="ko-KR" dirty="0"/>
               <a:t>Restart</a:t>
             </a:r>
             <a:endParaRPr lang="ko-KR" altLang="en-US" dirty="0"/>

</xml_diff>